<commit_message>
add misa minggu palma 20210328
</commit_message>
<xml_diff>
--- a/2021 02 tanggal 17 (Rabu Abu)/Bahasa Indonesia.pptx
+++ b/2021 02 tanggal 17 (Rabu Abu)/Bahasa Indonesia.pptx
@@ -30434,7 +30434,38 @@
                 </a:solidFill>
                 <a:latin typeface="Arial Black" panose="020B0A04020102020204" pitchFamily="34" charset="0"/>
               </a:rPr>
-              <a:t>suci kepadaMu mahasuci.</a:t>
+              <a:t>suci kepadaMu </a:t>
+            </a:r>
+            <a:endParaRPr lang="sv-SE" sz="4000" dirty="0" smtClean="0">
+              <a:solidFill>
+                <a:schemeClr val="accent4"/>
+              </a:solidFill>
+              <a:latin typeface="Arial Black" panose="020B0A04020102020204" pitchFamily="34" charset="0"/>
+            </a:endParaRPr>
+          </a:p>
+          <a:p>
+            <a:pPr marL="152400" indent="0" algn="l">
+              <a:spcAft>
+                <a:spcPts val="1200"/>
+              </a:spcAft>
+            </a:pPr>
+            <a:r>
+              <a:rPr lang="sv-SE" sz="4000" dirty="0" smtClean="0">
+                <a:solidFill>
+                  <a:schemeClr val="accent4"/>
+                </a:solidFill>
+                <a:latin typeface="Arial Black" panose="020B0A04020102020204" pitchFamily="34" charset="0"/>
+              </a:rPr>
+              <a:t>mahasuci</a:t>
+            </a:r>
+            <a:r>
+              <a:rPr lang="sv-SE" sz="4000" dirty="0">
+                <a:solidFill>
+                  <a:schemeClr val="accent4"/>
+                </a:solidFill>
+                <a:latin typeface="Arial Black" panose="020B0A04020102020204" pitchFamily="34" charset="0"/>
+              </a:rPr>
+              <a:t>.</a:t>
             </a:r>
           </a:p>
         </p:txBody>

</xml_diff>